<commit_message>
add related cute tree and more cute tree
</commit_message>
<xml_diff>
--- a/deside/規格.pptx
+++ b/deside/規格.pptx
@@ -112,7 +112,7 @@
   </p:defaultTextStyle>
   <p:extLst>
     <p:ext uri="{EFAFB233-063F-42B5-8137-9DF3F51BA10A}">
-      <p15:sldGuideLst xmlns:p15="http://schemas.microsoft.com/office/powerpoint/2012/main"/>
+      <p15:sldGuideLst xmlns:p15="http://schemas.microsoft.com/office/powerpoint/2012/main" xmlns=""/>
     </p:ext>
   </p:extLst>
 </p:presentation>
@@ -200,7 +200,7 @@
           <a:p>
             <a:fld id="{8E6EEFD3-C284-42D6-BC73-E2D2CFC60522}" type="datetimeFigureOut">
               <a:rPr lang="en-US" smtClean="0"/>
-              <a:t>4/17/2017</a:t>
+              <a:t>4/18/2017</a:t>
             </a:fld>
             <a:endParaRPr lang="en-US"/>
           </a:p>
@@ -683,7 +683,7 @@
           <a:p>
             <a:fld id="{1EF2C4D0-62FC-4570-BD0B-D4A2DB622A69}" type="datetimeFigureOut">
               <a:rPr lang="en-US" smtClean="0"/>
-              <a:t>4/17/2017</a:t>
+              <a:t>4/18/2017</a:t>
             </a:fld>
             <a:endParaRPr lang="en-US"/>
           </a:p>
@@ -853,7 +853,7 @@
           <a:p>
             <a:fld id="{1EF2C4D0-62FC-4570-BD0B-D4A2DB622A69}" type="datetimeFigureOut">
               <a:rPr lang="en-US" smtClean="0"/>
-              <a:t>4/17/2017</a:t>
+              <a:t>4/18/2017</a:t>
             </a:fld>
             <a:endParaRPr lang="en-US"/>
           </a:p>
@@ -1033,7 +1033,7 @@
           <a:p>
             <a:fld id="{1EF2C4D0-62FC-4570-BD0B-D4A2DB622A69}" type="datetimeFigureOut">
               <a:rPr lang="en-US" smtClean="0"/>
-              <a:t>4/17/2017</a:t>
+              <a:t>4/18/2017</a:t>
             </a:fld>
             <a:endParaRPr lang="en-US"/>
           </a:p>
@@ -1203,7 +1203,7 @@
           <a:p>
             <a:fld id="{1EF2C4D0-62FC-4570-BD0B-D4A2DB622A69}" type="datetimeFigureOut">
               <a:rPr lang="en-US" smtClean="0"/>
-              <a:t>4/17/2017</a:t>
+              <a:t>4/18/2017</a:t>
             </a:fld>
             <a:endParaRPr lang="en-US"/>
           </a:p>
@@ -1447,7 +1447,7 @@
           <a:p>
             <a:fld id="{1EF2C4D0-62FC-4570-BD0B-D4A2DB622A69}" type="datetimeFigureOut">
               <a:rPr lang="en-US" smtClean="0"/>
-              <a:t>4/17/2017</a:t>
+              <a:t>4/18/2017</a:t>
             </a:fld>
             <a:endParaRPr lang="en-US"/>
           </a:p>
@@ -1679,7 +1679,7 @@
           <a:p>
             <a:fld id="{1EF2C4D0-62FC-4570-BD0B-D4A2DB622A69}" type="datetimeFigureOut">
               <a:rPr lang="en-US" smtClean="0"/>
-              <a:t>4/17/2017</a:t>
+              <a:t>4/18/2017</a:t>
             </a:fld>
             <a:endParaRPr lang="en-US"/>
           </a:p>
@@ -2046,7 +2046,7 @@
           <a:p>
             <a:fld id="{1EF2C4D0-62FC-4570-BD0B-D4A2DB622A69}" type="datetimeFigureOut">
               <a:rPr lang="en-US" smtClean="0"/>
-              <a:t>4/17/2017</a:t>
+              <a:t>4/18/2017</a:t>
             </a:fld>
             <a:endParaRPr lang="en-US"/>
           </a:p>
@@ -2164,7 +2164,7 @@
           <a:p>
             <a:fld id="{1EF2C4D0-62FC-4570-BD0B-D4A2DB622A69}" type="datetimeFigureOut">
               <a:rPr lang="en-US" smtClean="0"/>
-              <a:t>4/17/2017</a:t>
+              <a:t>4/18/2017</a:t>
             </a:fld>
             <a:endParaRPr lang="en-US"/>
           </a:p>
@@ -2259,7 +2259,7 @@
           <a:p>
             <a:fld id="{1EF2C4D0-62FC-4570-BD0B-D4A2DB622A69}" type="datetimeFigureOut">
               <a:rPr lang="en-US" smtClean="0"/>
-              <a:t>4/17/2017</a:t>
+              <a:t>4/18/2017</a:t>
             </a:fld>
             <a:endParaRPr lang="en-US"/>
           </a:p>
@@ -2536,7 +2536,7 @@
           <a:p>
             <a:fld id="{1EF2C4D0-62FC-4570-BD0B-D4A2DB622A69}" type="datetimeFigureOut">
               <a:rPr lang="en-US" smtClean="0"/>
-              <a:t>4/17/2017</a:t>
+              <a:t>4/18/2017</a:t>
             </a:fld>
             <a:endParaRPr lang="en-US"/>
           </a:p>
@@ -2793,7 +2793,7 @@
           <a:p>
             <a:fld id="{1EF2C4D0-62FC-4570-BD0B-D4A2DB622A69}" type="datetimeFigureOut">
               <a:rPr lang="en-US" smtClean="0"/>
-              <a:t>4/17/2017</a:t>
+              <a:t>4/18/2017</a:t>
             </a:fld>
             <a:endParaRPr lang="en-US"/>
           </a:p>
@@ -3006,7 +3006,7 @@
           <a:p>
             <a:fld id="{1EF2C4D0-62FC-4570-BD0B-D4A2DB622A69}" type="datetimeFigureOut">
               <a:rPr lang="en-US" smtClean="0"/>
-              <a:t>4/17/2017</a:t>
+              <a:t>4/18/2017</a:t>
             </a:fld>
             <a:endParaRPr lang="en-US"/>
           </a:p>
@@ -4439,54 +4439,6 @@
           </a:fontRef>
         </p:style>
       </p:cxnSp>
-      <p:sp>
-        <p:nvSpPr>
-          <p:cNvPr id="52" name="矩形 51"/>
-          <p:cNvSpPr/>
-          <p:nvPr/>
-        </p:nvSpPr>
-        <p:spPr>
-          <a:xfrm>
-            <a:off x="1988820" y="982980"/>
-            <a:ext cx="1280160" cy="655320"/>
-          </a:xfrm>
-          <a:prstGeom prst="rect">
-            <a:avLst/>
-          </a:prstGeom>
-        </p:spPr>
-        <p:style>
-          <a:lnRef idx="2">
-            <a:schemeClr val="accent2">
-              <a:shade val="50000"/>
-            </a:schemeClr>
-          </a:lnRef>
-          <a:fillRef idx="1">
-            <a:schemeClr val="accent2"/>
-          </a:fillRef>
-          <a:effectRef idx="0">
-            <a:schemeClr val="accent2"/>
-          </a:effectRef>
-          <a:fontRef idx="minor">
-            <a:schemeClr val="lt1"/>
-          </a:fontRef>
-        </p:style>
-        <p:txBody>
-          <a:bodyPr rtlCol="0" anchor="ctr"/>
-          <a:lstStyle/>
-          <a:p>
-            <a:pPr algn="ctr"/>
-            <a:r>
-              <a:rPr lang="zh-TW" altLang="en-US" dirty="0" smtClean="0"/>
-              <a:t>更多</a:t>
-            </a:r>
-            <a:r>
-              <a:rPr lang="zh-TW" altLang="en-US" dirty="0"/>
-              <a:t>相關</a:t>
-            </a:r>
-            <a:endParaRPr lang="en-US" dirty="0"/>
-          </a:p>
-        </p:txBody>
-      </p:sp>
     </p:spTree>
     <p:extLst>
       <p:ext uri="{BB962C8B-B14F-4D97-AF65-F5344CB8AC3E}">
@@ -5861,7 +5813,7 @@
   <a:extraClrSchemeLst/>
   <a:extLst>
     <a:ext uri="{05A4C25C-085E-4340-85A3-A5531E510DB2}">
-      <thm15:themeFamily xmlns:thm15="http://schemas.microsoft.com/office/thememl/2012/main" name="Office Theme" id="{62F939B6-93AF-4DB8-9C6B-D6C7DFDC589F}" vid="{4A3C46E8-61CC-4603-A589-7422A47A8E4A}"/>
+      <thm15:themeFamily xmlns:thm15="http://schemas.microsoft.com/office/thememl/2012/main" xmlns="" name="Office Theme" id="{62F939B6-93AF-4DB8-9C6B-D6C7DFDC589F}" vid="{4A3C46E8-61CC-4603-A589-7422A47A8E4A}"/>
     </a:ext>
   </a:extLst>
 </a:theme>
@@ -6122,7 +6074,7 @@
   <a:extraClrSchemeLst/>
   <a:extLst>
     <a:ext uri="{05A4C25C-085E-4340-85A3-A5531E510DB2}">
-      <thm15:themeFamily xmlns:thm15="http://schemas.microsoft.com/office/thememl/2012/main" name="Office Theme" id="{62F939B6-93AF-4DB8-9C6B-D6C7DFDC589F}" vid="{4A3C46E8-61CC-4603-A589-7422A47A8E4A}"/>
+      <thm15:themeFamily xmlns:thm15="http://schemas.microsoft.com/office/thememl/2012/main" xmlns="" name="Office Theme" id="{62F939B6-93AF-4DB8-9C6B-D6C7DFDC589F}" vid="{4A3C46E8-61CC-4603-A589-7422A47A8E4A}"/>
     </a:ext>
   </a:extLst>
 </a:theme>

</xml_diff>

<commit_message>
finish the index and add the news
</commit_message>
<xml_diff>
--- a/deside/規格.pptx
+++ b/deside/規格.pptx
@@ -112,7 +112,18 @@
   </p:defaultTextStyle>
   <p:extLst>
     <p:ext uri="{EFAFB233-063F-42B5-8137-9DF3F51BA10A}">
-      <p15:sldGuideLst xmlns:p15="http://schemas.microsoft.com/office/powerpoint/2012/main" xmlns=""/>
+      <p15:sldGuideLst xmlns:p15="http://schemas.microsoft.com/office/powerpoint/2012/main">
+        <p15:guide id="1" orient="horz" pos="3840">
+          <p15:clr>
+            <a:srgbClr val="A4A3A4"/>
+          </p15:clr>
+        </p15:guide>
+        <p15:guide id="2" pos="2160">
+          <p15:clr>
+            <a:srgbClr val="A4A3A4"/>
+          </p15:clr>
+        </p15:guide>
+      </p15:sldGuideLst>
     </p:ext>
   </p:extLst>
 </p:presentation>
@@ -4507,7 +4518,7 @@
         </p:nvSpPr>
         <p:spPr>
           <a:xfrm>
-            <a:off x="0" y="408517"/>
+            <a:off x="-9525" y="408516"/>
             <a:ext cx="6857999" cy="10439400"/>
           </a:xfrm>
           <a:prstGeom prst="rect">
@@ -4604,7 +4615,7 @@
         </p:nvSpPr>
         <p:spPr>
           <a:xfrm>
-            <a:off x="3091848" y="3624792"/>
+            <a:off x="3106147" y="3641196"/>
             <a:ext cx="3766152" cy="2407708"/>
           </a:xfrm>
           <a:custGeom>
@@ -5813,7 +5824,7 @@
   <a:extraClrSchemeLst/>
   <a:extLst>
     <a:ext uri="{05A4C25C-085E-4340-85A3-A5531E510DB2}">
-      <thm15:themeFamily xmlns:thm15="http://schemas.microsoft.com/office/thememl/2012/main" xmlns="" name="Office Theme" id="{62F939B6-93AF-4DB8-9C6B-D6C7DFDC589F}" vid="{4A3C46E8-61CC-4603-A589-7422A47A8E4A}"/>
+      <thm15:themeFamily xmlns:thm15="http://schemas.microsoft.com/office/thememl/2012/main" name="Office Theme" id="{62F939B6-93AF-4DB8-9C6B-D6C7DFDC589F}" vid="{4A3C46E8-61CC-4603-A589-7422A47A8E4A}"/>
     </a:ext>
   </a:extLst>
 </a:theme>
@@ -6074,7 +6085,7 @@
   <a:extraClrSchemeLst/>
   <a:extLst>
     <a:ext uri="{05A4C25C-085E-4340-85A3-A5531E510DB2}">
-      <thm15:themeFamily xmlns:thm15="http://schemas.microsoft.com/office/thememl/2012/main" xmlns="" name="Office Theme" id="{62F939B6-93AF-4DB8-9C6B-D6C7DFDC589F}" vid="{4A3C46E8-61CC-4603-A589-7422A47A8E4A}"/>
+      <thm15:themeFamily xmlns:thm15="http://schemas.microsoft.com/office/thememl/2012/main" name="Office Theme" id="{62F939B6-93AF-4DB8-9C6B-D6C7DFDC589F}" vid="{4A3C46E8-61CC-4603-A589-7422A47A8E4A}"/>
     </a:ext>
   </a:extLst>
 </a:theme>

</xml_diff>